<commit_message>
Add example code for generating cat.analysis results
Needed to generate some results so I could work on the visualization
piece.
</commit_message>
<xml_diff>
--- a/AnalysisSprintWorkflow.20161213.pptx
+++ b/AnalysisSprintWorkflow.20161213.pptx
@@ -268,7 +268,7 @@
           <a:p>
             <a:fld id="{A26575A1-AE90-4F21-90BB-C91DF37CF914}" type="datetimeFigureOut">
               <a:rPr lang="en-US" smtClean="0"/>
-              <a:t>12/13/2016</a:t>
+              <a:t>12/16/2016</a:t>
             </a:fld>
             <a:endParaRPr lang="en-US"/>
           </a:p>
@@ -436,7 +436,7 @@
           <a:p>
             <a:fld id="{A26575A1-AE90-4F21-90BB-C91DF37CF914}" type="datetimeFigureOut">
               <a:rPr lang="en-US" smtClean="0"/>
-              <a:t>12/13/2016</a:t>
+              <a:t>12/16/2016</a:t>
             </a:fld>
             <a:endParaRPr lang="en-US"/>
           </a:p>
@@ -614,7 +614,7 @@
           <a:p>
             <a:fld id="{A26575A1-AE90-4F21-90BB-C91DF37CF914}" type="datetimeFigureOut">
               <a:rPr lang="en-US" smtClean="0"/>
-              <a:t>12/13/2016</a:t>
+              <a:t>12/16/2016</a:t>
             </a:fld>
             <a:endParaRPr lang="en-US"/>
           </a:p>
@@ -782,7 +782,7 @@
           <a:p>
             <a:fld id="{A26575A1-AE90-4F21-90BB-C91DF37CF914}" type="datetimeFigureOut">
               <a:rPr lang="en-US" smtClean="0"/>
-              <a:t>12/13/2016</a:t>
+              <a:t>12/16/2016</a:t>
             </a:fld>
             <a:endParaRPr lang="en-US"/>
           </a:p>
@@ -1027,7 +1027,7 @@
           <a:p>
             <a:fld id="{A26575A1-AE90-4F21-90BB-C91DF37CF914}" type="datetimeFigureOut">
               <a:rPr lang="en-US" smtClean="0"/>
-              <a:t>12/13/2016</a:t>
+              <a:t>12/16/2016</a:t>
             </a:fld>
             <a:endParaRPr lang="en-US"/>
           </a:p>
@@ -1256,7 +1256,7 @@
           <a:p>
             <a:fld id="{A26575A1-AE90-4F21-90BB-C91DF37CF914}" type="datetimeFigureOut">
               <a:rPr lang="en-US" smtClean="0"/>
-              <a:t>12/13/2016</a:t>
+              <a:t>12/16/2016</a:t>
             </a:fld>
             <a:endParaRPr lang="en-US"/>
           </a:p>
@@ -1620,7 +1620,7 @@
           <a:p>
             <a:fld id="{A26575A1-AE90-4F21-90BB-C91DF37CF914}" type="datetimeFigureOut">
               <a:rPr lang="en-US" smtClean="0"/>
-              <a:t>12/13/2016</a:t>
+              <a:t>12/16/2016</a:t>
             </a:fld>
             <a:endParaRPr lang="en-US"/>
           </a:p>
@@ -1737,7 +1737,7 @@
           <a:p>
             <a:fld id="{A26575A1-AE90-4F21-90BB-C91DF37CF914}" type="datetimeFigureOut">
               <a:rPr lang="en-US" smtClean="0"/>
-              <a:t>12/13/2016</a:t>
+              <a:t>12/16/2016</a:t>
             </a:fld>
             <a:endParaRPr lang="en-US"/>
           </a:p>
@@ -1832,7 +1832,7 @@
           <a:p>
             <a:fld id="{A26575A1-AE90-4F21-90BB-C91DF37CF914}" type="datetimeFigureOut">
               <a:rPr lang="en-US" smtClean="0"/>
-              <a:t>12/13/2016</a:t>
+              <a:t>12/16/2016</a:t>
             </a:fld>
             <a:endParaRPr lang="en-US"/>
           </a:p>
@@ -2107,7 +2107,7 @@
           <a:p>
             <a:fld id="{A26575A1-AE90-4F21-90BB-C91DF37CF914}" type="datetimeFigureOut">
               <a:rPr lang="en-US" smtClean="0"/>
-              <a:t>12/13/2016</a:t>
+              <a:t>12/16/2016</a:t>
             </a:fld>
             <a:endParaRPr lang="en-US"/>
           </a:p>
@@ -2359,7 +2359,7 @@
           <a:p>
             <a:fld id="{A26575A1-AE90-4F21-90BB-C91DF37CF914}" type="datetimeFigureOut">
               <a:rPr lang="en-US" smtClean="0"/>
-              <a:t>12/13/2016</a:t>
+              <a:t>12/16/2016</a:t>
             </a:fld>
             <a:endParaRPr lang="en-US"/>
           </a:p>
@@ -2570,7 +2570,7 @@
           <a:p>
             <a:fld id="{A26575A1-AE90-4F21-90BB-C91DF37CF914}" type="datetimeFigureOut">
               <a:rPr lang="en-US" smtClean="0"/>
-              <a:t>12/13/2016</a:t>
+              <a:t>12/16/2016</a:t>
             </a:fld>
             <a:endParaRPr lang="en-US"/>
           </a:p>
@@ -5471,6 +5471,47 @@
           </a:fontRef>
         </p:style>
       </p:cxnSp>
+      <p:pic>
+        <p:nvPicPr>
+          <p:cNvPr id="58" name="Picture 6" descr="Image result for table icon"/>
+          <p:cNvPicPr>
+            <a:picLocks noChangeAspect="1" noChangeArrowheads="1"/>
+          </p:cNvPicPr>
+          <p:nvPr/>
+        </p:nvPicPr>
+        <p:blipFill>
+          <a:blip r:embed="rId6" cstate="print">
+            <a:extLst>
+              <a:ext uri="{28A0092B-C50C-407E-A947-70E740481C1C}">
+                <a14:useLocalDpi xmlns:a14="http://schemas.microsoft.com/office/drawing/2010/main" val="0"/>
+              </a:ext>
+            </a:extLst>
+          </a:blip>
+          <a:srcRect/>
+          <a:stretch>
+            <a:fillRect/>
+          </a:stretch>
+        </p:blipFill>
+        <p:spPr bwMode="auto">
+          <a:xfrm>
+            <a:off x="1198071" y="5224574"/>
+            <a:ext cx="309062" cy="309062"/>
+          </a:xfrm>
+          <a:prstGeom prst="rect">
+            <a:avLst/>
+          </a:prstGeom>
+          <a:noFill/>
+          <a:extLst>
+            <a:ext uri="{909E8E84-426E-40DD-AFC4-6F175D3DCCD1}">
+              <a14:hiddenFill xmlns:a14="http://schemas.microsoft.com/office/drawing/2010/main">
+                <a:solidFill>
+                  <a:srgbClr val="FFFFFF"/>
+                </a:solidFill>
+              </a14:hiddenFill>
+            </a:ext>
+          </a:extLst>
+        </p:spPr>
+      </p:pic>
     </p:spTree>
     <p:extLst>
       <p:ext uri="{BB962C8B-B14F-4D97-AF65-F5344CB8AC3E}">

</xml_diff>